<commit_message>
completed flow design menu
</commit_message>
<xml_diff>
--- a/Flow Design Menus.pptx
+++ b/Flow Design Menus.pptx
@@ -10,6 +10,7 @@
     <p:sldId id="257" r:id="rId4"/>
     <p:sldId id="258" r:id="rId5"/>
     <p:sldId id="259" r:id="rId6"/>
+    <p:sldId id="261" r:id="rId7"/>
   </p:sldIdLst>
   <p:sldSz cx="12192000" cy="6858000"/>
   <p:notesSz cx="6858000" cy="9144000"/>
@@ -242,7 +243,7 @@
           <a:p>
             <a:fld id="{441FEABF-9240-46FB-84B4-3C16E874D95C}" type="datetimeFigureOut">
               <a:rPr lang="en-GB" smtClean="0"/>
-              <a:t>17/03/2017</a:t>
+              <a:t>19/03/2017</a:t>
             </a:fld>
             <a:endParaRPr lang="en-GB"/>
           </a:p>
@@ -412,7 +413,7 @@
           <a:p>
             <a:fld id="{441FEABF-9240-46FB-84B4-3C16E874D95C}" type="datetimeFigureOut">
               <a:rPr lang="en-GB" smtClean="0"/>
-              <a:t>17/03/2017</a:t>
+              <a:t>19/03/2017</a:t>
             </a:fld>
             <a:endParaRPr lang="en-GB"/>
           </a:p>
@@ -592,7 +593,7 @@
           <a:p>
             <a:fld id="{441FEABF-9240-46FB-84B4-3C16E874D95C}" type="datetimeFigureOut">
               <a:rPr lang="en-GB" smtClean="0"/>
-              <a:t>17/03/2017</a:t>
+              <a:t>19/03/2017</a:t>
             </a:fld>
             <a:endParaRPr lang="en-GB"/>
           </a:p>
@@ -762,7 +763,7 @@
           <a:p>
             <a:fld id="{441FEABF-9240-46FB-84B4-3C16E874D95C}" type="datetimeFigureOut">
               <a:rPr lang="en-GB" smtClean="0"/>
-              <a:t>17/03/2017</a:t>
+              <a:t>19/03/2017</a:t>
             </a:fld>
             <a:endParaRPr lang="en-GB"/>
           </a:p>
@@ -1008,7 +1009,7 @@
           <a:p>
             <a:fld id="{441FEABF-9240-46FB-84B4-3C16E874D95C}" type="datetimeFigureOut">
               <a:rPr lang="en-GB" smtClean="0"/>
-              <a:t>17/03/2017</a:t>
+              <a:t>19/03/2017</a:t>
             </a:fld>
             <a:endParaRPr lang="en-GB"/>
           </a:p>
@@ -1240,7 +1241,7 @@
           <a:p>
             <a:fld id="{441FEABF-9240-46FB-84B4-3C16E874D95C}" type="datetimeFigureOut">
               <a:rPr lang="en-GB" smtClean="0"/>
-              <a:t>17/03/2017</a:t>
+              <a:t>19/03/2017</a:t>
             </a:fld>
             <a:endParaRPr lang="en-GB"/>
           </a:p>
@@ -1607,7 +1608,7 @@
           <a:p>
             <a:fld id="{441FEABF-9240-46FB-84B4-3C16E874D95C}" type="datetimeFigureOut">
               <a:rPr lang="en-GB" smtClean="0"/>
-              <a:t>17/03/2017</a:t>
+              <a:t>19/03/2017</a:t>
             </a:fld>
             <a:endParaRPr lang="en-GB"/>
           </a:p>
@@ -1725,7 +1726,7 @@
           <a:p>
             <a:fld id="{441FEABF-9240-46FB-84B4-3C16E874D95C}" type="datetimeFigureOut">
               <a:rPr lang="en-GB" smtClean="0"/>
-              <a:t>17/03/2017</a:t>
+              <a:t>19/03/2017</a:t>
             </a:fld>
             <a:endParaRPr lang="en-GB"/>
           </a:p>
@@ -1820,7 +1821,7 @@
           <a:p>
             <a:fld id="{441FEABF-9240-46FB-84B4-3C16E874D95C}" type="datetimeFigureOut">
               <a:rPr lang="en-GB" smtClean="0"/>
-              <a:t>17/03/2017</a:t>
+              <a:t>19/03/2017</a:t>
             </a:fld>
             <a:endParaRPr lang="en-GB"/>
           </a:p>
@@ -2097,7 +2098,7 @@
           <a:p>
             <a:fld id="{441FEABF-9240-46FB-84B4-3C16E874D95C}" type="datetimeFigureOut">
               <a:rPr lang="en-GB" smtClean="0"/>
-              <a:t>17/03/2017</a:t>
+              <a:t>19/03/2017</a:t>
             </a:fld>
             <a:endParaRPr lang="en-GB"/>
           </a:p>
@@ -2350,7 +2351,7 @@
           <a:p>
             <a:fld id="{441FEABF-9240-46FB-84B4-3C16E874D95C}" type="datetimeFigureOut">
               <a:rPr lang="en-GB" smtClean="0"/>
-              <a:t>17/03/2017</a:t>
+              <a:t>19/03/2017</a:t>
             </a:fld>
             <a:endParaRPr lang="en-GB"/>
           </a:p>
@@ -2563,7 +2564,7 @@
           <a:p>
             <a:fld id="{441FEABF-9240-46FB-84B4-3C16E874D95C}" type="datetimeFigureOut">
               <a:rPr lang="en-GB" smtClean="0"/>
-              <a:t>17/03/2017</a:t>
+              <a:t>19/03/2017</a:t>
             </a:fld>
             <a:endParaRPr lang="en-GB"/>
           </a:p>
@@ -3065,14 +3066,93 @@
         </p:blipFill>
         <p:spPr>
           <a:xfrm>
-            <a:off x="1104674" y="2239348"/>
-            <a:ext cx="2707517" cy="2030638"/>
+            <a:off x="847097" y="1917376"/>
+            <a:ext cx="4054652" cy="3040989"/>
           </a:xfrm>
           <a:prstGeom prst="rect">
             <a:avLst/>
           </a:prstGeom>
         </p:spPr>
       </p:pic>
+      <p:sp>
+        <p:nvSpPr>
+          <p:cNvPr id="3" name="TextBox 2"/>
+          <p:cNvSpPr txBox="1"/>
+          <p:nvPr/>
+        </p:nvSpPr>
+        <p:spPr>
+          <a:xfrm>
+            <a:off x="5280338" y="2060620"/>
+            <a:ext cx="5859887" cy="3139321"/>
+          </a:xfrm>
+          <a:prstGeom prst="rect">
+            <a:avLst/>
+          </a:prstGeom>
+          <a:noFill/>
+        </p:spPr>
+        <p:txBody>
+          <a:bodyPr wrap="square" rtlCol="0">
+            <a:spAutoFit/>
+          </a:bodyPr>
+          <a:lstStyle/>
+          <a:p>
+            <a:r>
+              <a:rPr lang="en-GB" dirty="0" smtClean="0">
+                <a:latin typeface="Times New Roman" panose="02020603050405020304" pitchFamily="18" charset="0"/>
+                <a:cs typeface="Times New Roman" panose="02020603050405020304" pitchFamily="18" charset="0"/>
+              </a:rPr>
+              <a:t>When the player opens up our game they will come onto this screen. When they press play they will proceed to the game screen where they can start playing the game</a:t>
+            </a:r>
+            <a:r>
+              <a:rPr lang="en-GB" dirty="0" smtClean="0">
+                <a:latin typeface="Times New Roman" panose="02020603050405020304" pitchFamily="18" charset="0"/>
+                <a:cs typeface="Times New Roman" panose="02020603050405020304" pitchFamily="18" charset="0"/>
+              </a:rPr>
+              <a:t>.</a:t>
+            </a:r>
+          </a:p>
+          <a:p>
+            <a:endParaRPr lang="en-GB" dirty="0">
+              <a:latin typeface="Times New Roman" panose="02020603050405020304" pitchFamily="18" charset="0"/>
+              <a:cs typeface="Times New Roman" panose="02020603050405020304" pitchFamily="18" charset="0"/>
+            </a:endParaRPr>
+          </a:p>
+          <a:p>
+            <a:r>
+              <a:rPr lang="en-GB" dirty="0" smtClean="0">
+                <a:latin typeface="Times New Roman" panose="02020603050405020304" pitchFamily="18" charset="0"/>
+                <a:cs typeface="Times New Roman" panose="02020603050405020304" pitchFamily="18" charset="0"/>
+              </a:rPr>
+              <a:t>They can also select the settings button which will bring them to the settings screen.</a:t>
+            </a:r>
+          </a:p>
+          <a:p>
+            <a:endParaRPr lang="en-GB" dirty="0">
+              <a:latin typeface="Times New Roman" panose="02020603050405020304" pitchFamily="18" charset="0"/>
+              <a:cs typeface="Times New Roman" panose="02020603050405020304" pitchFamily="18" charset="0"/>
+            </a:endParaRPr>
+          </a:p>
+          <a:p>
+            <a:r>
+              <a:rPr lang="en-GB" dirty="0" smtClean="0">
+                <a:latin typeface="Times New Roman" panose="02020603050405020304" pitchFamily="18" charset="0"/>
+                <a:cs typeface="Times New Roman" panose="02020603050405020304" pitchFamily="18" charset="0"/>
+              </a:rPr>
+              <a:t>They can also select the instructions button. This will then bring them to the instructions screen.</a:t>
+            </a:r>
+            <a:endParaRPr lang="en-GB" dirty="0" smtClean="0">
+              <a:latin typeface="Times New Roman" panose="02020603050405020304" pitchFamily="18" charset="0"/>
+              <a:cs typeface="Times New Roman" panose="02020603050405020304" pitchFamily="18" charset="0"/>
+            </a:endParaRPr>
+          </a:p>
+          <a:p>
+            <a:endParaRPr lang="en-GB" dirty="0"/>
+          </a:p>
+          <a:p>
+            <a:endParaRPr lang="en-GB" dirty="0"/>
+          </a:p>
+        </p:txBody>
+      </p:sp>
     </p:spTree>
     <p:extLst>
       <p:ext uri="{BB962C8B-B14F-4D97-AF65-F5344CB8AC3E}">
@@ -3124,8 +3204,19 @@
                 <a:latin typeface="Times New Roman" panose="02020603050405020304" pitchFamily="18" charset="0"/>
                 <a:cs typeface="Times New Roman" panose="02020603050405020304" pitchFamily="18" charset="0"/>
               </a:rPr>
-              <a:t>Play Menu</a:t>
-            </a:r>
+              <a:t>Play </a:t>
+            </a:r>
+            <a:r>
+              <a:rPr lang="en-GB" dirty="0" smtClean="0">
+                <a:latin typeface="Times New Roman" panose="02020603050405020304" pitchFamily="18" charset="0"/>
+                <a:cs typeface="Times New Roman" panose="02020603050405020304" pitchFamily="18" charset="0"/>
+              </a:rPr>
+              <a:t>Icon</a:t>
+            </a:r>
+            <a:endParaRPr lang="en-GB" dirty="0">
+              <a:latin typeface="Times New Roman" panose="02020603050405020304" pitchFamily="18" charset="0"/>
+              <a:cs typeface="Times New Roman" panose="02020603050405020304" pitchFamily="18" charset="0"/>
+            </a:endParaRPr>
           </a:p>
         </p:txBody>
       </p:sp>
@@ -3145,14 +3236,78 @@
         </p:blipFill>
         <p:spPr>
           <a:xfrm>
-            <a:off x="1375891" y="2446745"/>
-            <a:ext cx="1563046" cy="1612071"/>
+            <a:off x="1144072" y="2029286"/>
+            <a:ext cx="2852490" cy="2941958"/>
           </a:xfrm>
           <a:prstGeom prst="rect">
             <a:avLst/>
           </a:prstGeom>
         </p:spPr>
       </p:pic>
+      <p:sp>
+        <p:nvSpPr>
+          <p:cNvPr id="3" name="TextBox 2"/>
+          <p:cNvSpPr txBox="1"/>
+          <p:nvPr/>
+        </p:nvSpPr>
+        <p:spPr>
+          <a:xfrm>
+            <a:off x="4803820" y="2305318"/>
+            <a:ext cx="6168980" cy="923330"/>
+          </a:xfrm>
+          <a:prstGeom prst="rect">
+            <a:avLst/>
+          </a:prstGeom>
+          <a:noFill/>
+        </p:spPr>
+        <p:txBody>
+          <a:bodyPr wrap="square" rtlCol="0">
+            <a:spAutoFit/>
+          </a:bodyPr>
+          <a:lstStyle/>
+          <a:p>
+            <a:r>
+              <a:rPr lang="en-GB" dirty="0" smtClean="0">
+                <a:latin typeface="Times New Roman" panose="02020603050405020304" pitchFamily="18" charset="0"/>
+                <a:cs typeface="Times New Roman" panose="02020603050405020304" pitchFamily="18" charset="0"/>
+              </a:rPr>
+              <a:t>This is the play button for our game. </a:t>
+            </a:r>
+            <a:r>
+              <a:rPr lang="en-GB" dirty="0">
+                <a:latin typeface="Times New Roman" panose="02020603050405020304" pitchFamily="18" charset="0"/>
+                <a:cs typeface="Times New Roman" panose="02020603050405020304" pitchFamily="18" charset="0"/>
+              </a:rPr>
+              <a:t>P</a:t>
+            </a:r>
+            <a:r>
+              <a:rPr lang="en-GB" dirty="0" smtClean="0">
+                <a:latin typeface="Times New Roman" panose="02020603050405020304" pitchFamily="18" charset="0"/>
+                <a:cs typeface="Times New Roman" panose="02020603050405020304" pitchFamily="18" charset="0"/>
+              </a:rPr>
+              <a:t>layers will encounter this when they are on the pause menu. When they select this the current game will resume </a:t>
+            </a:r>
+            <a:r>
+              <a:rPr lang="en-GB" dirty="0" smtClean="0">
+                <a:latin typeface="Times New Roman" panose="02020603050405020304" pitchFamily="18" charset="0"/>
+                <a:cs typeface="Times New Roman" panose="02020603050405020304" pitchFamily="18" charset="0"/>
+              </a:rPr>
+              <a:t>onto </a:t>
+            </a:r>
+            <a:r>
+              <a:rPr lang="en-GB" dirty="0" smtClean="0">
+                <a:latin typeface="Times New Roman" panose="02020603050405020304" pitchFamily="18" charset="0"/>
+                <a:cs typeface="Times New Roman" panose="02020603050405020304" pitchFamily="18" charset="0"/>
+              </a:rPr>
+              <a:t>the game screen.</a:t>
+            </a:r>
+            <a:endParaRPr lang="en-GB" dirty="0">
+              <a:latin typeface="Times New Roman" panose="02020603050405020304" pitchFamily="18" charset="0"/>
+              <a:cs typeface="Times New Roman" panose="02020603050405020304" pitchFamily="18" charset="0"/>
+            </a:endParaRPr>
+          </a:p>
+        </p:txBody>
+      </p:sp>
     </p:spTree>
     <p:extLst>
       <p:ext uri="{BB962C8B-B14F-4D97-AF65-F5344CB8AC3E}">
@@ -3218,7 +3373,7 @@
           <p:nvPr/>
         </p:nvPicPr>
         <p:blipFill>
-          <a:blip r:embed="rId2">
+          <a:blip r:embed="rId2" cstate="print">
             <a:extLst>
               <a:ext uri="{28A0092B-C50C-407E-A947-70E740481C1C}">
                 <a14:useLocalDpi xmlns:a14="http://schemas.microsoft.com/office/drawing/2010/main" val="0"/>
@@ -3231,14 +3386,95 @@
         </p:blipFill>
         <p:spPr>
           <a:xfrm>
-            <a:off x="4683967" y="2062065"/>
-            <a:ext cx="2824065" cy="2118049"/>
+            <a:off x="1180914" y="1926370"/>
+            <a:ext cx="4420441" cy="3315331"/>
           </a:xfrm>
           <a:prstGeom prst="rect">
             <a:avLst/>
           </a:prstGeom>
         </p:spPr>
       </p:pic>
+      <p:sp>
+        <p:nvSpPr>
+          <p:cNvPr id="3" name="TextBox 2"/>
+          <p:cNvSpPr txBox="1"/>
+          <p:nvPr/>
+        </p:nvSpPr>
+        <p:spPr>
+          <a:xfrm>
+            <a:off x="6091707" y="2062065"/>
+            <a:ext cx="5254580" cy="2862322"/>
+          </a:xfrm>
+          <a:prstGeom prst="rect">
+            <a:avLst/>
+          </a:prstGeom>
+          <a:noFill/>
+        </p:spPr>
+        <p:txBody>
+          <a:bodyPr wrap="square" rtlCol="0">
+            <a:spAutoFit/>
+          </a:bodyPr>
+          <a:lstStyle/>
+          <a:p>
+            <a:r>
+              <a:rPr lang="en-GB" dirty="0" smtClean="0">
+                <a:latin typeface="Times New Roman" panose="02020603050405020304" pitchFamily="18" charset="0"/>
+                <a:cs typeface="Times New Roman" panose="02020603050405020304" pitchFamily="18" charset="0"/>
+              </a:rPr>
+              <a:t>This is our pause menu. Players will encounter this when they press the pause button on the game screen, on the pause screen they can then select the play, settings or quit button. </a:t>
+            </a:r>
+          </a:p>
+          <a:p>
+            <a:endParaRPr lang="en-GB" dirty="0">
+              <a:latin typeface="Times New Roman" panose="02020603050405020304" pitchFamily="18" charset="0"/>
+              <a:cs typeface="Times New Roman" panose="02020603050405020304" pitchFamily="18" charset="0"/>
+            </a:endParaRPr>
+          </a:p>
+          <a:p>
+            <a:pPr marL="285750" indent="-285750">
+              <a:buFont typeface="Arial" panose="020B0604020202020204" pitchFamily="34" charset="0"/>
+              <a:buChar char="•"/>
+            </a:pPr>
+            <a:r>
+              <a:rPr lang="en-GB" dirty="0" smtClean="0">
+                <a:latin typeface="Times New Roman" panose="02020603050405020304" pitchFamily="18" charset="0"/>
+                <a:cs typeface="Times New Roman" panose="02020603050405020304" pitchFamily="18" charset="0"/>
+              </a:rPr>
+              <a:t>The play button will resume the game</a:t>
+            </a:r>
+          </a:p>
+          <a:p>
+            <a:pPr marL="285750" indent="-285750">
+              <a:buFont typeface="Arial" panose="020B0604020202020204" pitchFamily="34" charset="0"/>
+              <a:buChar char="•"/>
+            </a:pPr>
+            <a:r>
+              <a:rPr lang="en-GB" dirty="0" smtClean="0">
+                <a:latin typeface="Times New Roman" panose="02020603050405020304" pitchFamily="18" charset="0"/>
+                <a:cs typeface="Times New Roman" panose="02020603050405020304" pitchFamily="18" charset="0"/>
+              </a:rPr>
+              <a:t>The settings button will bring the player to the settings screen</a:t>
+            </a:r>
+          </a:p>
+          <a:p>
+            <a:pPr marL="285750" indent="-285750">
+              <a:buFont typeface="Arial" panose="020B0604020202020204" pitchFamily="34" charset="0"/>
+              <a:buChar char="•"/>
+            </a:pPr>
+            <a:r>
+              <a:rPr lang="en-GB" dirty="0" smtClean="0">
+                <a:latin typeface="Times New Roman" panose="02020603050405020304" pitchFamily="18" charset="0"/>
+                <a:cs typeface="Times New Roman" panose="02020603050405020304" pitchFamily="18" charset="0"/>
+              </a:rPr>
+              <a:t>The quit button will bring the player back to the menu screen.</a:t>
+            </a:r>
+            <a:endParaRPr lang="en-GB" dirty="0">
+              <a:latin typeface="Times New Roman" panose="02020603050405020304" pitchFamily="18" charset="0"/>
+              <a:cs typeface="Times New Roman" panose="02020603050405020304" pitchFamily="18" charset="0"/>
+            </a:endParaRPr>
+          </a:p>
+        </p:txBody>
+      </p:sp>
     </p:spTree>
     <p:extLst>
       <p:ext uri="{BB962C8B-B14F-4D97-AF65-F5344CB8AC3E}">
@@ -3290,8 +3526,19 @@
                 <a:latin typeface="Times New Roman" panose="02020603050405020304" pitchFamily="18" charset="0"/>
                 <a:cs typeface="Times New Roman" panose="02020603050405020304" pitchFamily="18" charset="0"/>
               </a:rPr>
-              <a:t>Settings Menu</a:t>
-            </a:r>
+              <a:t>Settings </a:t>
+            </a:r>
+            <a:r>
+              <a:rPr lang="en-GB" dirty="0" smtClean="0">
+                <a:latin typeface="Times New Roman" panose="02020603050405020304" pitchFamily="18" charset="0"/>
+                <a:cs typeface="Times New Roman" panose="02020603050405020304" pitchFamily="18" charset="0"/>
+              </a:rPr>
+              <a:t>Icon</a:t>
+            </a:r>
+            <a:endParaRPr lang="en-GB" dirty="0">
+              <a:latin typeface="Times New Roman" panose="02020603050405020304" pitchFamily="18" charset="0"/>
+              <a:cs typeface="Times New Roman" panose="02020603050405020304" pitchFamily="18" charset="0"/>
+            </a:endParaRPr>
           </a:p>
         </p:txBody>
       </p:sp>
@@ -3311,18 +3558,203 @@
         </p:blipFill>
         <p:spPr>
           <a:xfrm>
-            <a:off x="838200" y="2446612"/>
-            <a:ext cx="2053155" cy="2022751"/>
+            <a:off x="1185929" y="2227671"/>
+            <a:ext cx="3141372" cy="3094853"/>
           </a:xfrm>
           <a:prstGeom prst="rect">
             <a:avLst/>
           </a:prstGeom>
         </p:spPr>
       </p:pic>
+      <p:sp>
+        <p:nvSpPr>
+          <p:cNvPr id="3" name="TextBox 2"/>
+          <p:cNvSpPr txBox="1"/>
+          <p:nvPr/>
+        </p:nvSpPr>
+        <p:spPr>
+          <a:xfrm>
+            <a:off x="5190186" y="2227671"/>
+            <a:ext cx="5499279" cy="1477328"/>
+          </a:xfrm>
+          <a:prstGeom prst="rect">
+            <a:avLst/>
+          </a:prstGeom>
+          <a:noFill/>
+        </p:spPr>
+        <p:txBody>
+          <a:bodyPr wrap="square" rtlCol="0">
+            <a:spAutoFit/>
+          </a:bodyPr>
+          <a:lstStyle/>
+          <a:p>
+            <a:r>
+              <a:rPr lang="en-GB" dirty="0" smtClean="0">
+                <a:latin typeface="Times New Roman" panose="02020603050405020304" pitchFamily="18" charset="0"/>
+                <a:cs typeface="Times New Roman" panose="02020603050405020304" pitchFamily="18" charset="0"/>
+              </a:rPr>
+              <a:t>This is the settings button for our game. players will encounter this on the main menu and the pause menu. When the players select this they will then be directed to the settings screen</a:t>
+            </a:r>
+            <a:endParaRPr lang="en-GB" dirty="0" smtClean="0"/>
+          </a:p>
+          <a:p>
+            <a:endParaRPr lang="en-GB" dirty="0" smtClean="0"/>
+          </a:p>
+        </p:txBody>
+      </p:sp>
     </p:spTree>
     <p:extLst>
       <p:ext uri="{BB962C8B-B14F-4D97-AF65-F5344CB8AC3E}">
         <p14:creationId xmlns:p14="http://schemas.microsoft.com/office/powerpoint/2010/main" val="569291761"/>
+      </p:ext>
+    </p:extLst>
+  </p:cSld>
+  <p:clrMapOvr>
+    <a:masterClrMapping/>
+  </p:clrMapOvr>
+</p:sld>
+</file>
+
+<file path=ppt/slides/slide6.xml><?xml version="1.0" encoding="utf-8"?>
+<p:sld xmlns:a="http://schemas.openxmlformats.org/drawingml/2006/main" xmlns:r="http://schemas.openxmlformats.org/officeDocument/2006/relationships" xmlns:p="http://schemas.openxmlformats.org/presentationml/2006/main">
+  <p:cSld>
+    <p:spTree>
+      <p:nvGrpSpPr>
+        <p:cNvPr id="1" name=""/>
+        <p:cNvGrpSpPr/>
+        <p:nvPr/>
+      </p:nvGrpSpPr>
+      <p:grpSpPr>
+        <a:xfrm>
+          <a:off x="0" y="0"/>
+          <a:ext cx="0" cy="0"/>
+          <a:chOff x="0" y="0"/>
+          <a:chExt cx="0" cy="0"/>
+        </a:xfrm>
+      </p:grpSpPr>
+      <p:sp>
+        <p:nvSpPr>
+          <p:cNvPr id="2" name="Title 1"/>
+          <p:cNvSpPr>
+            <a:spLocks noGrp="1"/>
+          </p:cNvSpPr>
+          <p:nvPr>
+            <p:ph type="title"/>
+          </p:nvPr>
+        </p:nvSpPr>
+        <p:spPr/>
+        <p:txBody>
+          <a:bodyPr/>
+          <a:lstStyle/>
+          <a:p>
+            <a:pPr algn="ctr"/>
+            <a:r>
+              <a:rPr lang="en-GB" dirty="0" smtClean="0">
+                <a:latin typeface="Times New Roman" panose="02020603050405020304" pitchFamily="18" charset="0"/>
+                <a:cs typeface="Times New Roman" panose="02020603050405020304" pitchFamily="18" charset="0"/>
+              </a:rPr>
+              <a:t>Settings Menu</a:t>
+            </a:r>
+            <a:endParaRPr lang="en-GB" dirty="0">
+              <a:latin typeface="Times New Roman" panose="02020603050405020304" pitchFamily="18" charset="0"/>
+              <a:cs typeface="Times New Roman" panose="02020603050405020304" pitchFamily="18" charset="0"/>
+            </a:endParaRPr>
+          </a:p>
+        </p:txBody>
+      </p:sp>
+      <p:sp>
+        <p:nvSpPr>
+          <p:cNvPr id="3" name="Content Placeholder 2"/>
+          <p:cNvSpPr>
+            <a:spLocks noGrp="1"/>
+          </p:cNvSpPr>
+          <p:nvPr>
+            <p:ph idx="1"/>
+          </p:nvPr>
+        </p:nvSpPr>
+        <p:spPr>
+          <a:xfrm>
+            <a:off x="5666704" y="1825625"/>
+            <a:ext cx="5687096" cy="4351338"/>
+          </a:xfrm>
+        </p:spPr>
+        <p:txBody>
+          <a:bodyPr/>
+          <a:lstStyle/>
+          <a:p>
+            <a:pPr marL="0" indent="0">
+              <a:buNone/>
+            </a:pPr>
+            <a:r>
+              <a:rPr lang="en-GB" sz="1800" dirty="0">
+                <a:latin typeface="Times New Roman" panose="02020603050405020304" pitchFamily="18" charset="0"/>
+                <a:cs typeface="Times New Roman" panose="02020603050405020304" pitchFamily="18" charset="0"/>
+              </a:rPr>
+              <a:t>In the setting's screen the players can change: </a:t>
+            </a:r>
+          </a:p>
+          <a:p>
+            <a:pPr marL="285750" indent="-285750"/>
+            <a:r>
+              <a:rPr lang="en-GB" sz="1800" dirty="0">
+                <a:latin typeface="Times New Roman" panose="02020603050405020304" pitchFamily="18" charset="0"/>
+                <a:cs typeface="Times New Roman" panose="02020603050405020304" pitchFamily="18" charset="0"/>
+              </a:rPr>
+              <a:t>Volume of the sound</a:t>
+            </a:r>
+          </a:p>
+          <a:p>
+            <a:pPr marL="285750" indent="-285750"/>
+            <a:r>
+              <a:rPr lang="en-GB" sz="1800" dirty="0">
+                <a:latin typeface="Times New Roman" panose="02020603050405020304" pitchFamily="18" charset="0"/>
+                <a:cs typeface="Times New Roman" panose="02020603050405020304" pitchFamily="18" charset="0"/>
+              </a:rPr>
+              <a:t>Brightness of the screen</a:t>
+            </a:r>
+          </a:p>
+          <a:p>
+            <a:pPr marL="285750" indent="-285750"/>
+            <a:r>
+              <a:rPr lang="en-GB" sz="1800" dirty="0">
+                <a:latin typeface="Times New Roman" panose="02020603050405020304" pitchFamily="18" charset="0"/>
+                <a:cs typeface="Times New Roman" panose="02020603050405020304" pitchFamily="18" charset="0"/>
+              </a:rPr>
+              <a:t>Sensitivity of the players spaceships</a:t>
+            </a:r>
+          </a:p>
+          <a:p>
+            <a:pPr marL="285750" indent="-285750"/>
+            <a:r>
+              <a:rPr lang="en-GB" sz="1800" dirty="0">
+                <a:latin typeface="Times New Roman" panose="02020603050405020304" pitchFamily="18" charset="0"/>
+                <a:cs typeface="Times New Roman" panose="02020603050405020304" pitchFamily="18" charset="0"/>
+              </a:rPr>
+              <a:t>Screen size of the game</a:t>
+            </a:r>
+          </a:p>
+          <a:p>
+            <a:pPr marL="285750" indent="-285750"/>
+            <a:r>
+              <a:rPr lang="en-GB" sz="1800" dirty="0">
+                <a:latin typeface="Times New Roman" panose="02020603050405020304" pitchFamily="18" charset="0"/>
+                <a:cs typeface="Times New Roman" panose="02020603050405020304" pitchFamily="18" charset="0"/>
+              </a:rPr>
+              <a:t>Quality of the image</a:t>
+            </a:r>
+          </a:p>
+          <a:p>
+            <a:pPr marL="0" indent="0">
+              <a:buNone/>
+            </a:pPr>
+            <a:endParaRPr lang="en-GB" dirty="0"/>
+          </a:p>
+        </p:txBody>
+      </p:sp>
+    </p:spTree>
+    <p:extLst>
+      <p:ext uri="{BB962C8B-B14F-4D97-AF65-F5344CB8AC3E}">
+        <p14:creationId xmlns:p14="http://schemas.microsoft.com/office/powerpoint/2010/main" val="980385422"/>
       </p:ext>
     </p:extLst>
   </p:cSld>
@@ -3621,7 +4053,7 @@
   <a:extraClrSchemeLst/>
   <a:extLst>
     <a:ext uri="{05A4C25C-085E-4340-85A3-A5531E510DB2}">
-      <thm15:themeFamily xmlns:thm15="http://schemas.microsoft.com/office/thememl/2012/main" name="Office Theme" id="{62F939B6-93AF-4DB8-9C6B-D6C7DFDC589F}" vid="{4A3C46E8-61CC-4603-A589-7422A47A8E4A}"/>
+      <thm15:themeFamily xmlns="" xmlns:thm15="http://schemas.microsoft.com/office/thememl/2012/main" name="Office Theme" id="{62F939B6-93AF-4DB8-9C6B-D6C7DFDC589F}" vid="{4A3C46E8-61CC-4603-A589-7422A47A8E4A}"/>
     </a:ext>
   </a:extLst>
 </a:theme>

</xml_diff>